<commit_message>
Rename title in ppt
</commit_message>
<xml_diff>
--- a/Indeksi-PostgreSQL.pptx
+++ b/Indeksi-PostgreSQL.pptx
@@ -8867,10 +8867,18 @@
               <a:buNone/>
             </a:pPr>
             <a:r>
-              <a:rPr lang="sr"/>
-              <a:t>Indeksi kod PostgreSQL</a:t>
+              <a:rPr lang="sr" dirty="0"/>
+              <a:t>Indeksi </a:t>
             </a:r>
-            <a:endParaRPr/>
+            <a:r>
+              <a:rPr lang="sr" dirty="0" smtClean="0"/>
+              <a:t>u </a:t>
+            </a:r>
+            <a:r>
+              <a:rPr lang="sr" dirty="0"/>
+              <a:t>PostgreSQL</a:t>
+            </a:r>
+            <a:endParaRPr dirty="0"/>
           </a:p>
         </p:txBody>
       </p:sp>

</xml_diff>